<commit_message>
color change on ufo dashboard
</commit_message>
<xml_diff>
--- a/ufo_tableau/dashboard.pptx
+++ b/ufo_tableau/dashboard.pptx
@@ -2745,12 +2745,9 @@
 <p:sldMaster xmlns:a="http://schemas.openxmlformats.org/drawingml/2006/main" xmlns:r="http://schemas.openxmlformats.org/officeDocument/2006/relationships" xmlns:p="http://schemas.openxmlformats.org/presentationml/2006/main">
   <p:cSld>
     <p:bg>
-      <p:bgPr>
-        <a:solidFill>
-          <a:srgbClr val="B4B4B4"/>
-        </a:solidFill>
-        <a:effectLst/>
-      </p:bgPr>
+      <p:bgRef idx="1001">
+        <a:schemeClr val="bg1"/>
+      </p:bgRef>
     </p:bg>
     <p:spTree>
       <p:nvGrpSpPr>
@@ -3315,6 +3312,14 @@
 <file path=ppt/slides/slide1.xml><?xml version="1.0" encoding="utf-8"?>
 <p:sld xmlns:a="http://schemas.openxmlformats.org/drawingml/2006/main" xmlns:r="http://schemas.openxmlformats.org/officeDocument/2006/relationships" xmlns:p="http://schemas.openxmlformats.org/presentationml/2006/main">
   <p:cSld>
+    <p:bg>
+      <p:bgPr>
+        <a:solidFill>
+          <a:srgbClr val="B4B4B4"/>
+        </a:solidFill>
+        <a:effectLst/>
+      </p:bgPr>
+    </p:bg>
     <p:spTree>
       <p:nvGrpSpPr>
         <p:cNvPr id="1" name=""/>
@@ -3334,7 +3339,7 @@
           <p:cNvPr id="2" name="slide2" descr="Main">
             <a:extLst>
               <a:ext uri="{FF2B5EF4-FFF2-40B4-BE49-F238E27FC236}">
-                <a16:creationId xmlns:a16="http://schemas.microsoft.com/office/drawing/2014/main" id="{A3E8B4A9-171B-4DC9-81D0-2B2DDA33B95D}"/>
+                <a16:creationId xmlns:a16="http://schemas.microsoft.com/office/drawing/2014/main" id="{5F46B64E-DF08-434C-A5FB-A7B15BDD4FA7}"/>
               </a:ext>
             </a:extLst>
           </p:cNvPr>

</xml_diff>